<commit_message>
literature review and text structure
</commit_message>
<xml_diff>
--- a/Latex/Paper/images/Vorlage.pptx
+++ b/Latex/Paper/images/Vorlage.pptx
@@ -105,6 +105,11 @@
       </a:defRPr>
     </a:lvl9pPr>
   </p:defaultTextStyle>
+  <p:extLst>
+    <p:ext uri="{EFAFB233-063F-42B5-8137-9DF3F51BA10A}">
+      <p15:sldGuideLst xmlns:p15="http://schemas.microsoft.com/office/powerpoint/2012/main"/>
+    </p:ext>
+  </p:extLst>
 </p:presentation>
 </file>
 
@@ -255,7 +260,7 @@
           <a:p>
             <a:fld id="{E193FCFE-1254-4AE3-8342-6682C4E922EC}" type="datetimeFigureOut">
               <a:rPr lang="de-DE" smtClean="0"/>
-              <a:t>13.04.2023</a:t>
+              <a:t>01.09.2023</a:t>
             </a:fld>
             <a:endParaRPr lang="de-DE"/>
           </a:p>
@@ -453,7 +458,7 @@
           <a:p>
             <a:fld id="{E193FCFE-1254-4AE3-8342-6682C4E922EC}" type="datetimeFigureOut">
               <a:rPr lang="de-DE" smtClean="0"/>
-              <a:t>13.04.2023</a:t>
+              <a:t>01.09.2023</a:t>
             </a:fld>
             <a:endParaRPr lang="de-DE"/>
           </a:p>
@@ -661,7 +666,7 @@
           <a:p>
             <a:fld id="{E193FCFE-1254-4AE3-8342-6682C4E922EC}" type="datetimeFigureOut">
               <a:rPr lang="de-DE" smtClean="0"/>
-              <a:t>13.04.2023</a:t>
+              <a:t>01.09.2023</a:t>
             </a:fld>
             <a:endParaRPr lang="de-DE"/>
           </a:p>
@@ -859,7 +864,7 @@
           <a:p>
             <a:fld id="{E193FCFE-1254-4AE3-8342-6682C4E922EC}" type="datetimeFigureOut">
               <a:rPr lang="de-DE" smtClean="0"/>
-              <a:t>13.04.2023</a:t>
+              <a:t>01.09.2023</a:t>
             </a:fld>
             <a:endParaRPr lang="de-DE"/>
           </a:p>
@@ -1134,7 +1139,7 @@
           <a:p>
             <a:fld id="{E193FCFE-1254-4AE3-8342-6682C4E922EC}" type="datetimeFigureOut">
               <a:rPr lang="de-DE" smtClean="0"/>
-              <a:t>13.04.2023</a:t>
+              <a:t>01.09.2023</a:t>
             </a:fld>
             <a:endParaRPr lang="de-DE"/>
           </a:p>
@@ -1399,7 +1404,7 @@
           <a:p>
             <a:fld id="{E193FCFE-1254-4AE3-8342-6682C4E922EC}" type="datetimeFigureOut">
               <a:rPr lang="de-DE" smtClean="0"/>
-              <a:t>13.04.2023</a:t>
+              <a:t>01.09.2023</a:t>
             </a:fld>
             <a:endParaRPr lang="de-DE"/>
           </a:p>
@@ -1811,7 +1816,7 @@
           <a:p>
             <a:fld id="{E193FCFE-1254-4AE3-8342-6682C4E922EC}" type="datetimeFigureOut">
               <a:rPr lang="de-DE" smtClean="0"/>
-              <a:t>13.04.2023</a:t>
+              <a:t>01.09.2023</a:t>
             </a:fld>
             <a:endParaRPr lang="de-DE"/>
           </a:p>
@@ -1952,7 +1957,7 @@
           <a:p>
             <a:fld id="{E193FCFE-1254-4AE3-8342-6682C4E922EC}" type="datetimeFigureOut">
               <a:rPr lang="de-DE" smtClean="0"/>
-              <a:t>13.04.2023</a:t>
+              <a:t>01.09.2023</a:t>
             </a:fld>
             <a:endParaRPr lang="de-DE"/>
           </a:p>
@@ -2065,7 +2070,7 @@
           <a:p>
             <a:fld id="{E193FCFE-1254-4AE3-8342-6682C4E922EC}" type="datetimeFigureOut">
               <a:rPr lang="de-DE" smtClean="0"/>
-              <a:t>13.04.2023</a:t>
+              <a:t>01.09.2023</a:t>
             </a:fld>
             <a:endParaRPr lang="de-DE"/>
           </a:p>
@@ -2376,7 +2381,7 @@
           <a:p>
             <a:fld id="{E193FCFE-1254-4AE3-8342-6682C4E922EC}" type="datetimeFigureOut">
               <a:rPr lang="de-DE" smtClean="0"/>
-              <a:t>13.04.2023</a:t>
+              <a:t>01.09.2023</a:t>
             </a:fld>
             <a:endParaRPr lang="de-DE"/>
           </a:p>
@@ -2664,7 +2669,7 @@
           <a:p>
             <a:fld id="{E193FCFE-1254-4AE3-8342-6682C4E922EC}" type="datetimeFigureOut">
               <a:rPr lang="de-DE" smtClean="0"/>
-              <a:t>13.04.2023</a:t>
+              <a:t>01.09.2023</a:t>
             </a:fld>
             <a:endParaRPr lang="de-DE"/>
           </a:p>
@@ -2905,7 +2910,7 @@
           <a:p>
             <a:fld id="{E193FCFE-1254-4AE3-8342-6682C4E922EC}" type="datetimeFigureOut">
               <a:rPr lang="de-DE" smtClean="0"/>
-              <a:t>13.04.2023</a:t>
+              <a:t>01.09.2023</a:t>
             </a:fld>
             <a:endParaRPr lang="de-DE"/>
           </a:p>
@@ -3374,318 +3379,402 @@
           </a:p>
         </p:txBody>
       </p:sp>
-      <p:pic>
-        <p:nvPicPr>
-          <p:cNvPr id="5" name="Grafik 4">
-            <a:extLst>
-              <a:ext uri="{FF2B5EF4-FFF2-40B4-BE49-F238E27FC236}">
-                <a16:creationId xmlns:a16="http://schemas.microsoft.com/office/drawing/2014/main" id="{480BE980-D5B5-4F81-F932-390EB9C8473D}"/>
-              </a:ext>
-            </a:extLst>
-          </p:cNvPr>
-          <p:cNvPicPr>
-            <a:picLocks noChangeAspect="1"/>
-          </p:cNvPicPr>
+      <p:grpSp>
+        <p:nvGrpSpPr>
+          <p:cNvPr id="2" name="Gruppieren 1">
+            <a:extLst>
+              <a:ext uri="{FF2B5EF4-FFF2-40B4-BE49-F238E27FC236}">
+                <a16:creationId xmlns:a16="http://schemas.microsoft.com/office/drawing/2014/main" id="{226B1857-3B96-54B7-D226-2CCD695FE669}"/>
+              </a:ext>
+            </a:extLst>
+          </p:cNvPr>
+          <p:cNvGrpSpPr/>
           <p:nvPr/>
-        </p:nvPicPr>
-        <p:blipFill>
-          <a:blip r:embed="rId2"/>
-          <a:stretch>
-            <a:fillRect/>
-          </a:stretch>
-        </p:blipFill>
-        <p:spPr>
+        </p:nvGrpSpPr>
+        <p:grpSpPr>
           <a:xfrm>
-            <a:off x="1200964" y="829557"/>
-            <a:ext cx="3200801" cy="2880000"/>
+            <a:off x="402223" y="513174"/>
+            <a:ext cx="3200801" cy="3187838"/>
+            <a:chOff x="1200964" y="521719"/>
+            <a:chExt cx="3200801" cy="3187838"/>
           </a:xfrm>
-          <a:prstGeom prst="rect">
-            <a:avLst/>
-          </a:prstGeom>
-          <a:ln>
+        </p:grpSpPr>
+        <p:pic>
+          <p:nvPicPr>
+            <p:cNvPr id="5" name="Grafik 4">
+              <a:extLst>
+                <a:ext uri="{FF2B5EF4-FFF2-40B4-BE49-F238E27FC236}">
+                  <a16:creationId xmlns:a16="http://schemas.microsoft.com/office/drawing/2014/main" id="{480BE980-D5B5-4F81-F932-390EB9C8473D}"/>
+                </a:ext>
+              </a:extLst>
+            </p:cNvPr>
+            <p:cNvPicPr>
+              <a:picLocks noChangeAspect="1"/>
+            </p:cNvPicPr>
+            <p:nvPr/>
+          </p:nvPicPr>
+          <p:blipFill>
+            <a:blip r:embed="rId2"/>
+            <a:stretch>
+              <a:fillRect/>
+            </a:stretch>
+          </p:blipFill>
+          <p:spPr>
+            <a:xfrm>
+              <a:off x="1200964" y="829557"/>
+              <a:ext cx="3200801" cy="2880000"/>
+            </a:xfrm>
+            <a:prstGeom prst="rect">
+              <a:avLst/>
+            </a:prstGeom>
+            <a:ln>
+              <a:noFill/>
+            </a:ln>
+          </p:spPr>
+        </p:pic>
+        <p:sp>
+          <p:nvSpPr>
+            <p:cNvPr id="12" name="Textfeld 11">
+              <a:extLst>
+                <a:ext uri="{FF2B5EF4-FFF2-40B4-BE49-F238E27FC236}">
+                  <a16:creationId xmlns:a16="http://schemas.microsoft.com/office/drawing/2014/main" id="{8B6116D8-D7E1-691A-653B-4B309E86D0FE}"/>
+                </a:ext>
+              </a:extLst>
+            </p:cNvPr>
+            <p:cNvSpPr txBox="1"/>
+            <p:nvPr/>
+          </p:nvSpPr>
+          <p:spPr>
+            <a:xfrm>
+              <a:off x="1357460" y="521719"/>
+              <a:ext cx="822661" cy="307777"/>
+            </a:xfrm>
+            <a:prstGeom prst="rect">
+              <a:avLst/>
+            </a:prstGeom>
             <a:noFill/>
-          </a:ln>
-        </p:spPr>
-      </p:pic>
-      <p:pic>
-        <p:nvPicPr>
-          <p:cNvPr id="7" name="Grafik 6">
-            <a:extLst>
-              <a:ext uri="{FF2B5EF4-FFF2-40B4-BE49-F238E27FC236}">
-                <a16:creationId xmlns:a16="http://schemas.microsoft.com/office/drawing/2014/main" id="{AFAC76C7-7317-A06A-AB04-E148D306F3BC}"/>
-              </a:ext>
-            </a:extLst>
-          </p:cNvPr>
-          <p:cNvPicPr>
-            <a:picLocks noChangeAspect="1"/>
-          </p:cNvPicPr>
+          </p:spPr>
+          <p:txBody>
+            <a:bodyPr wrap="none" rtlCol="0">
+              <a:spAutoFit/>
+            </a:bodyPr>
+            <a:lstStyle/>
+            <a:p>
+              <a:r>
+                <a:rPr lang="de-DE" sz="1400" dirty="0">
+                  <a:latin typeface="Arial" panose="020B0604020202020204" pitchFamily="34" charset="0"/>
+                  <a:cs typeface="Arial" panose="020B0604020202020204" pitchFamily="34" charset="0"/>
+                </a:rPr>
+                <a:t>Panel </a:t>
+              </a:r>
+              <a:r>
+                <a:rPr lang="de-DE" sz="1400" b="1" dirty="0">
+                  <a:latin typeface="Arial" panose="020B0604020202020204" pitchFamily="34" charset="0"/>
+                  <a:cs typeface="Arial" panose="020B0604020202020204" pitchFamily="34" charset="0"/>
+                </a:rPr>
+                <a:t>A</a:t>
+              </a:r>
+            </a:p>
+          </p:txBody>
+        </p:sp>
+      </p:grpSp>
+      <p:grpSp>
+        <p:nvGrpSpPr>
+          <p:cNvPr id="3" name="Gruppieren 2">
+            <a:extLst>
+              <a:ext uri="{FF2B5EF4-FFF2-40B4-BE49-F238E27FC236}">
+                <a16:creationId xmlns:a16="http://schemas.microsoft.com/office/drawing/2014/main" id="{D72A3E82-15EF-2F3D-92F0-CDF14C0C4FD7}"/>
+              </a:ext>
+            </a:extLst>
+          </p:cNvPr>
+          <p:cNvGrpSpPr/>
           <p:nvPr/>
-        </p:nvPicPr>
-        <p:blipFill>
-          <a:blip r:embed="rId3"/>
-          <a:stretch>
-            <a:fillRect/>
-          </a:stretch>
-        </p:blipFill>
-        <p:spPr>
+        </p:nvGrpSpPr>
+        <p:grpSpPr>
           <a:xfrm>
-            <a:off x="4709511" y="829557"/>
-            <a:ext cx="3167641" cy="2880000"/>
+            <a:off x="3603024" y="513455"/>
+            <a:ext cx="3167641" cy="3187557"/>
+            <a:chOff x="4709511" y="522000"/>
+            <a:chExt cx="3167641" cy="3187557"/>
           </a:xfrm>
-          <a:prstGeom prst="rect">
-            <a:avLst/>
-          </a:prstGeom>
-          <a:ln>
+        </p:grpSpPr>
+        <p:pic>
+          <p:nvPicPr>
+            <p:cNvPr id="7" name="Grafik 6">
+              <a:extLst>
+                <a:ext uri="{FF2B5EF4-FFF2-40B4-BE49-F238E27FC236}">
+                  <a16:creationId xmlns:a16="http://schemas.microsoft.com/office/drawing/2014/main" id="{AFAC76C7-7317-A06A-AB04-E148D306F3BC}"/>
+                </a:ext>
+              </a:extLst>
+            </p:cNvPr>
+            <p:cNvPicPr>
+              <a:picLocks noChangeAspect="1"/>
+            </p:cNvPicPr>
+            <p:nvPr/>
+          </p:nvPicPr>
+          <p:blipFill>
+            <a:blip r:embed="rId3"/>
+            <a:stretch>
+              <a:fillRect/>
+            </a:stretch>
+          </p:blipFill>
+          <p:spPr>
+            <a:xfrm>
+              <a:off x="4709511" y="829557"/>
+              <a:ext cx="3167641" cy="2880000"/>
+            </a:xfrm>
+            <a:prstGeom prst="rect">
+              <a:avLst/>
+            </a:prstGeom>
+            <a:ln>
+              <a:noFill/>
+            </a:ln>
+          </p:spPr>
+        </p:pic>
+        <p:sp>
+          <p:nvSpPr>
+            <p:cNvPr id="13" name="Textfeld 12">
+              <a:extLst>
+                <a:ext uri="{FF2B5EF4-FFF2-40B4-BE49-F238E27FC236}">
+                  <a16:creationId xmlns:a16="http://schemas.microsoft.com/office/drawing/2014/main" id="{5427CA4E-0526-176D-353F-D3E06CDB3781}"/>
+                </a:ext>
+              </a:extLst>
+            </p:cNvPr>
+            <p:cNvSpPr txBox="1"/>
+            <p:nvPr/>
+          </p:nvSpPr>
+          <p:spPr>
+            <a:xfrm>
+              <a:off x="4882828" y="522000"/>
+              <a:ext cx="822661" cy="307777"/>
+            </a:xfrm>
+            <a:prstGeom prst="rect">
+              <a:avLst/>
+            </a:prstGeom>
             <a:noFill/>
-          </a:ln>
-        </p:spPr>
-      </p:pic>
-      <p:pic>
-        <p:nvPicPr>
-          <p:cNvPr id="9" name="Grafik 8">
-            <a:extLst>
-              <a:ext uri="{FF2B5EF4-FFF2-40B4-BE49-F238E27FC236}">
-                <a16:creationId xmlns:a16="http://schemas.microsoft.com/office/drawing/2014/main" id="{94AA335D-F4DD-98ED-3CAD-51E4BB147DFF}"/>
-              </a:ext>
-            </a:extLst>
-          </p:cNvPr>
-          <p:cNvPicPr>
-            <a:picLocks noChangeAspect="1"/>
-          </p:cNvPicPr>
+          </p:spPr>
+          <p:txBody>
+            <a:bodyPr wrap="none" rtlCol="0">
+              <a:spAutoFit/>
+            </a:bodyPr>
+            <a:lstStyle/>
+            <a:p>
+              <a:r>
+                <a:rPr lang="de-DE" sz="1400" dirty="0">
+                  <a:latin typeface="Arial" panose="020B0604020202020204" pitchFamily="34" charset="0"/>
+                  <a:cs typeface="Arial" panose="020B0604020202020204" pitchFamily="34" charset="0"/>
+                </a:rPr>
+                <a:t>Panel </a:t>
+              </a:r>
+              <a:r>
+                <a:rPr lang="de-DE" sz="1400" b="1" dirty="0">
+                  <a:latin typeface="Arial" panose="020B0604020202020204" pitchFamily="34" charset="0"/>
+                  <a:cs typeface="Arial" panose="020B0604020202020204" pitchFamily="34" charset="0"/>
+                </a:rPr>
+                <a:t>B</a:t>
+              </a:r>
+            </a:p>
+          </p:txBody>
+        </p:sp>
+      </p:grpSp>
+      <p:grpSp>
+        <p:nvGrpSpPr>
+          <p:cNvPr id="4" name="Gruppieren 3">
+            <a:extLst>
+              <a:ext uri="{FF2B5EF4-FFF2-40B4-BE49-F238E27FC236}">
+                <a16:creationId xmlns:a16="http://schemas.microsoft.com/office/drawing/2014/main" id="{41BACE3D-AAED-E142-4D95-97B1E8183ACC}"/>
+              </a:ext>
+            </a:extLst>
+          </p:cNvPr>
+          <p:cNvGrpSpPr/>
           <p:nvPr/>
-        </p:nvPicPr>
-        <p:blipFill>
-          <a:blip r:embed="rId4"/>
-          <a:stretch>
-            <a:fillRect/>
-          </a:stretch>
-        </p:blipFill>
-        <p:spPr>
+        </p:nvGrpSpPr>
+        <p:grpSpPr>
           <a:xfrm>
-            <a:off x="1200964" y="3978000"/>
-            <a:ext cx="3177684" cy="2880000"/>
+            <a:off x="6838269" y="544024"/>
+            <a:ext cx="3177684" cy="3156988"/>
+            <a:chOff x="1200964" y="3701012"/>
+            <a:chExt cx="3177684" cy="3156988"/>
           </a:xfrm>
-          <a:prstGeom prst="rect">
-            <a:avLst/>
-          </a:prstGeom>
-          <a:ln>
+        </p:grpSpPr>
+        <p:pic>
+          <p:nvPicPr>
+            <p:cNvPr id="9" name="Grafik 8">
+              <a:extLst>
+                <a:ext uri="{FF2B5EF4-FFF2-40B4-BE49-F238E27FC236}">
+                  <a16:creationId xmlns:a16="http://schemas.microsoft.com/office/drawing/2014/main" id="{94AA335D-F4DD-98ED-3CAD-51E4BB147DFF}"/>
+                </a:ext>
+              </a:extLst>
+            </p:cNvPr>
+            <p:cNvPicPr>
+              <a:picLocks noChangeAspect="1"/>
+            </p:cNvPicPr>
+            <p:nvPr/>
+          </p:nvPicPr>
+          <p:blipFill>
+            <a:blip r:embed="rId4"/>
+            <a:stretch>
+              <a:fillRect/>
+            </a:stretch>
+          </p:blipFill>
+          <p:spPr>
+            <a:xfrm>
+              <a:off x="1200964" y="3978000"/>
+              <a:ext cx="3177684" cy="2880000"/>
+            </a:xfrm>
+            <a:prstGeom prst="rect">
+              <a:avLst/>
+            </a:prstGeom>
+            <a:ln>
+              <a:noFill/>
+            </a:ln>
+          </p:spPr>
+        </p:pic>
+        <p:sp>
+          <p:nvSpPr>
+            <p:cNvPr id="14" name="Textfeld 13">
+              <a:extLst>
+                <a:ext uri="{FF2B5EF4-FFF2-40B4-BE49-F238E27FC236}">
+                  <a16:creationId xmlns:a16="http://schemas.microsoft.com/office/drawing/2014/main" id="{EE865542-333E-D974-9C52-5CDA6AEF3721}"/>
+                </a:ext>
+              </a:extLst>
+            </p:cNvPr>
+            <p:cNvSpPr txBox="1"/>
+            <p:nvPr/>
+          </p:nvSpPr>
+          <p:spPr>
+            <a:xfrm>
+              <a:off x="1357460" y="3701012"/>
+              <a:ext cx="822661" cy="307777"/>
+            </a:xfrm>
+            <a:prstGeom prst="rect">
+              <a:avLst/>
+            </a:prstGeom>
             <a:noFill/>
-          </a:ln>
-        </p:spPr>
-      </p:pic>
-      <p:pic>
-        <p:nvPicPr>
-          <p:cNvPr id="11" name="Grafik 10">
-            <a:extLst>
-              <a:ext uri="{FF2B5EF4-FFF2-40B4-BE49-F238E27FC236}">
-                <a16:creationId xmlns:a16="http://schemas.microsoft.com/office/drawing/2014/main" id="{37161D34-A608-8F01-F371-099AE72DC869}"/>
-              </a:ext>
-            </a:extLst>
-          </p:cNvPr>
-          <p:cNvPicPr>
-            <a:picLocks noChangeAspect="1"/>
-          </p:cNvPicPr>
+          </p:spPr>
+          <p:txBody>
+            <a:bodyPr wrap="none" rtlCol="0">
+              <a:spAutoFit/>
+            </a:bodyPr>
+            <a:lstStyle/>
+            <a:p>
+              <a:r>
+                <a:rPr lang="de-DE" sz="1400" dirty="0">
+                  <a:latin typeface="Arial" panose="020B0604020202020204" pitchFamily="34" charset="0"/>
+                  <a:cs typeface="Arial" panose="020B0604020202020204" pitchFamily="34" charset="0"/>
+                </a:rPr>
+                <a:t>Panel </a:t>
+              </a:r>
+              <a:r>
+                <a:rPr lang="de-DE" sz="1400" b="1" dirty="0">
+                  <a:latin typeface="Arial" panose="020B0604020202020204" pitchFamily="34" charset="0"/>
+                  <a:cs typeface="Arial" panose="020B0604020202020204" pitchFamily="34" charset="0"/>
+                </a:rPr>
+                <a:t>C</a:t>
+              </a:r>
+            </a:p>
+          </p:txBody>
+        </p:sp>
+      </p:grpSp>
+      <p:grpSp>
+        <p:nvGrpSpPr>
+          <p:cNvPr id="6" name="Gruppieren 5">
+            <a:extLst>
+              <a:ext uri="{FF2B5EF4-FFF2-40B4-BE49-F238E27FC236}">
+                <a16:creationId xmlns:a16="http://schemas.microsoft.com/office/drawing/2014/main" id="{F95EAE94-FBDE-788B-E7CF-C520C94B793A}"/>
+              </a:ext>
+            </a:extLst>
+          </p:cNvPr>
+          <p:cNvGrpSpPr/>
           <p:nvPr/>
-        </p:nvPicPr>
-        <p:blipFill>
-          <a:blip r:embed="rId5"/>
-          <a:stretch>
-            <a:fillRect/>
-          </a:stretch>
-        </p:blipFill>
-        <p:spPr>
+        </p:nvGrpSpPr>
+        <p:grpSpPr>
           <a:xfrm>
-            <a:off x="4709511" y="3978000"/>
-            <a:ext cx="3175842" cy="2880000"/>
+            <a:off x="6229505" y="3569318"/>
+            <a:ext cx="3175842" cy="3156707"/>
+            <a:chOff x="4709511" y="3701293"/>
+            <a:chExt cx="3175842" cy="3156707"/>
           </a:xfrm>
-          <a:prstGeom prst="rect">
-            <a:avLst/>
-          </a:prstGeom>
-          <a:ln>
+        </p:grpSpPr>
+        <p:pic>
+          <p:nvPicPr>
+            <p:cNvPr id="11" name="Grafik 10">
+              <a:extLst>
+                <a:ext uri="{FF2B5EF4-FFF2-40B4-BE49-F238E27FC236}">
+                  <a16:creationId xmlns:a16="http://schemas.microsoft.com/office/drawing/2014/main" id="{37161D34-A608-8F01-F371-099AE72DC869}"/>
+                </a:ext>
+              </a:extLst>
+            </p:cNvPr>
+            <p:cNvPicPr>
+              <a:picLocks noChangeAspect="1"/>
+            </p:cNvPicPr>
+            <p:nvPr/>
+          </p:nvPicPr>
+          <p:blipFill>
+            <a:blip r:embed="rId5"/>
+            <a:stretch>
+              <a:fillRect/>
+            </a:stretch>
+          </p:blipFill>
+          <p:spPr>
+            <a:xfrm>
+              <a:off x="4709511" y="3978000"/>
+              <a:ext cx="3175842" cy="2880000"/>
+            </a:xfrm>
+            <a:prstGeom prst="rect">
+              <a:avLst/>
+            </a:prstGeom>
+            <a:ln>
+              <a:noFill/>
+            </a:ln>
+          </p:spPr>
+        </p:pic>
+        <p:sp>
+          <p:nvSpPr>
+            <p:cNvPr id="15" name="Textfeld 14">
+              <a:extLst>
+                <a:ext uri="{FF2B5EF4-FFF2-40B4-BE49-F238E27FC236}">
+                  <a16:creationId xmlns:a16="http://schemas.microsoft.com/office/drawing/2014/main" id="{9DA8ABCB-2FAC-457C-4456-5CA9CD5C10F6}"/>
+                </a:ext>
+              </a:extLst>
+            </p:cNvPr>
+            <p:cNvSpPr txBox="1"/>
+            <p:nvPr/>
+          </p:nvSpPr>
+          <p:spPr>
+            <a:xfrm>
+              <a:off x="4882828" y="3701293"/>
+              <a:ext cx="822661" cy="307777"/>
+            </a:xfrm>
+            <a:prstGeom prst="rect">
+              <a:avLst/>
+            </a:prstGeom>
             <a:noFill/>
-          </a:ln>
-        </p:spPr>
-      </p:pic>
-      <p:sp>
-        <p:nvSpPr>
-          <p:cNvPr id="12" name="Textfeld 11">
-            <a:extLst>
-              <a:ext uri="{FF2B5EF4-FFF2-40B4-BE49-F238E27FC236}">
-                <a16:creationId xmlns:a16="http://schemas.microsoft.com/office/drawing/2014/main" id="{8B6116D8-D7E1-691A-653B-4B309E86D0FE}"/>
-              </a:ext>
-            </a:extLst>
-          </p:cNvPr>
-          <p:cNvSpPr txBox="1"/>
-          <p:nvPr/>
-        </p:nvSpPr>
-        <p:spPr>
-          <a:xfrm>
-            <a:off x="1357460" y="521719"/>
-            <a:ext cx="822661" cy="307777"/>
-          </a:xfrm>
-          <a:prstGeom prst="rect">
-            <a:avLst/>
-          </a:prstGeom>
-          <a:noFill/>
-        </p:spPr>
-        <p:txBody>
-          <a:bodyPr wrap="none" rtlCol="0">
-            <a:spAutoFit/>
-          </a:bodyPr>
-          <a:lstStyle/>
-          <a:p>
-            <a:r>
-              <a:rPr lang="de-DE" sz="1400" dirty="0">
-                <a:latin typeface="Arial" panose="020B0604020202020204" pitchFamily="34" charset="0"/>
-                <a:cs typeface="Arial" panose="020B0604020202020204" pitchFamily="34" charset="0"/>
-              </a:rPr>
-              <a:t>Panel </a:t>
-            </a:r>
-            <a:r>
-              <a:rPr lang="de-DE" sz="1400" b="1" dirty="0">
-                <a:latin typeface="Arial" panose="020B0604020202020204" pitchFamily="34" charset="0"/>
-                <a:cs typeface="Arial" panose="020B0604020202020204" pitchFamily="34" charset="0"/>
-              </a:rPr>
-              <a:t>A</a:t>
-            </a:r>
-          </a:p>
-        </p:txBody>
-      </p:sp>
-      <p:sp>
-        <p:nvSpPr>
-          <p:cNvPr id="13" name="Textfeld 12">
-            <a:extLst>
-              <a:ext uri="{FF2B5EF4-FFF2-40B4-BE49-F238E27FC236}">
-                <a16:creationId xmlns:a16="http://schemas.microsoft.com/office/drawing/2014/main" id="{5427CA4E-0526-176D-353F-D3E06CDB3781}"/>
-              </a:ext>
-            </a:extLst>
-          </p:cNvPr>
-          <p:cNvSpPr txBox="1"/>
-          <p:nvPr/>
-        </p:nvSpPr>
-        <p:spPr>
-          <a:xfrm>
-            <a:off x="4882828" y="522000"/>
-            <a:ext cx="822661" cy="307777"/>
-          </a:xfrm>
-          <a:prstGeom prst="rect">
-            <a:avLst/>
-          </a:prstGeom>
-          <a:noFill/>
-        </p:spPr>
-        <p:txBody>
-          <a:bodyPr wrap="none" rtlCol="0">
-            <a:spAutoFit/>
-          </a:bodyPr>
-          <a:lstStyle/>
-          <a:p>
-            <a:r>
-              <a:rPr lang="de-DE" sz="1400" dirty="0">
-                <a:latin typeface="Arial" panose="020B0604020202020204" pitchFamily="34" charset="0"/>
-                <a:cs typeface="Arial" panose="020B0604020202020204" pitchFamily="34" charset="0"/>
-              </a:rPr>
-              <a:t>Panel </a:t>
-            </a:r>
-            <a:r>
-              <a:rPr lang="de-DE" sz="1400" b="1" dirty="0">
-                <a:latin typeface="Arial" panose="020B0604020202020204" pitchFamily="34" charset="0"/>
-                <a:cs typeface="Arial" panose="020B0604020202020204" pitchFamily="34" charset="0"/>
-              </a:rPr>
-              <a:t>B</a:t>
-            </a:r>
-          </a:p>
-        </p:txBody>
-      </p:sp>
-      <p:sp>
-        <p:nvSpPr>
-          <p:cNvPr id="14" name="Textfeld 13">
-            <a:extLst>
-              <a:ext uri="{FF2B5EF4-FFF2-40B4-BE49-F238E27FC236}">
-                <a16:creationId xmlns:a16="http://schemas.microsoft.com/office/drawing/2014/main" id="{EE865542-333E-D974-9C52-5CDA6AEF3721}"/>
-              </a:ext>
-            </a:extLst>
-          </p:cNvPr>
-          <p:cNvSpPr txBox="1"/>
-          <p:nvPr/>
-        </p:nvSpPr>
-        <p:spPr>
-          <a:xfrm>
-            <a:off x="1357460" y="3701012"/>
-            <a:ext cx="822661" cy="307777"/>
-          </a:xfrm>
-          <a:prstGeom prst="rect">
-            <a:avLst/>
-          </a:prstGeom>
-          <a:noFill/>
-        </p:spPr>
-        <p:txBody>
-          <a:bodyPr wrap="none" rtlCol="0">
-            <a:spAutoFit/>
-          </a:bodyPr>
-          <a:lstStyle/>
-          <a:p>
-            <a:r>
-              <a:rPr lang="de-DE" sz="1400" dirty="0">
-                <a:latin typeface="Arial" panose="020B0604020202020204" pitchFamily="34" charset="0"/>
-                <a:cs typeface="Arial" panose="020B0604020202020204" pitchFamily="34" charset="0"/>
-              </a:rPr>
-              <a:t>Panel </a:t>
-            </a:r>
-            <a:r>
-              <a:rPr lang="de-DE" sz="1400" b="1" dirty="0">
-                <a:latin typeface="Arial" panose="020B0604020202020204" pitchFamily="34" charset="0"/>
-                <a:cs typeface="Arial" panose="020B0604020202020204" pitchFamily="34" charset="0"/>
-              </a:rPr>
-              <a:t>C</a:t>
-            </a:r>
-          </a:p>
-        </p:txBody>
-      </p:sp>
-      <p:sp>
-        <p:nvSpPr>
-          <p:cNvPr id="15" name="Textfeld 14">
-            <a:extLst>
-              <a:ext uri="{FF2B5EF4-FFF2-40B4-BE49-F238E27FC236}">
-                <a16:creationId xmlns:a16="http://schemas.microsoft.com/office/drawing/2014/main" id="{9DA8ABCB-2FAC-457C-4456-5CA9CD5C10F6}"/>
-              </a:ext>
-            </a:extLst>
-          </p:cNvPr>
-          <p:cNvSpPr txBox="1"/>
-          <p:nvPr/>
-        </p:nvSpPr>
-        <p:spPr>
-          <a:xfrm>
-            <a:off x="4882828" y="3701293"/>
-            <a:ext cx="822661" cy="307777"/>
-          </a:xfrm>
-          <a:prstGeom prst="rect">
-            <a:avLst/>
-          </a:prstGeom>
-          <a:noFill/>
-        </p:spPr>
-        <p:txBody>
-          <a:bodyPr wrap="none" rtlCol="0">
-            <a:spAutoFit/>
-          </a:bodyPr>
-          <a:lstStyle/>
-          <a:p>
-            <a:r>
-              <a:rPr lang="de-DE" sz="1400" dirty="0">
-                <a:latin typeface="Arial" panose="020B0604020202020204" pitchFamily="34" charset="0"/>
-                <a:cs typeface="Arial" panose="020B0604020202020204" pitchFamily="34" charset="0"/>
-              </a:rPr>
-              <a:t>Panel </a:t>
-            </a:r>
-            <a:r>
-              <a:rPr lang="de-DE" sz="1400" b="1" dirty="0">
-                <a:latin typeface="Arial" panose="020B0604020202020204" pitchFamily="34" charset="0"/>
-                <a:cs typeface="Arial" panose="020B0604020202020204" pitchFamily="34" charset="0"/>
-              </a:rPr>
-              <a:t>D</a:t>
-            </a:r>
-          </a:p>
-        </p:txBody>
-      </p:sp>
+          </p:spPr>
+          <p:txBody>
+            <a:bodyPr wrap="none" rtlCol="0">
+              <a:spAutoFit/>
+            </a:bodyPr>
+            <a:lstStyle/>
+            <a:p>
+              <a:r>
+                <a:rPr lang="de-DE" sz="1400" dirty="0">
+                  <a:latin typeface="Arial" panose="020B0604020202020204" pitchFamily="34" charset="0"/>
+                  <a:cs typeface="Arial" panose="020B0604020202020204" pitchFamily="34" charset="0"/>
+                </a:rPr>
+                <a:t>Panel </a:t>
+              </a:r>
+              <a:r>
+                <a:rPr lang="de-DE" sz="1400" b="1" dirty="0">
+                  <a:latin typeface="Arial" panose="020B0604020202020204" pitchFamily="34" charset="0"/>
+                  <a:cs typeface="Arial" panose="020B0604020202020204" pitchFamily="34" charset="0"/>
+                </a:rPr>
+                <a:t>D</a:t>
+              </a:r>
+            </a:p>
+          </p:txBody>
+        </p:sp>
+      </p:grpSp>
     </p:spTree>
     <p:extLst>
       <p:ext uri="{BB962C8B-B14F-4D97-AF65-F5344CB8AC3E}">
@@ -3737,8 +3826,8 @@
         </p:blipFill>
         <p:spPr>
           <a:xfrm>
-            <a:off x="2366128" y="0"/>
-            <a:ext cx="6862714" cy="6357602"/>
+            <a:off x="546207" y="284087"/>
+            <a:ext cx="4446510" cy="4119237"/>
           </a:xfrm>
           <a:prstGeom prst="rect">
             <a:avLst/>

</xml_diff>